<commit_message>
Geeting the APIs working
</commit_message>
<xml_diff>
--- a/Project1_Presentation.pptx
+++ b/Project1_Presentation.pptx
@@ -5,10 +5,10 @@
     <p:sldMasterId id="2147483705" r:id="rId4"/>
   </p:sldMasterIdLst>
   <p:notesMasterIdLst>
-    <p:notesMasterId r:id="rId20"/>
+    <p:notesMasterId r:id="rId22"/>
   </p:notesMasterIdLst>
   <p:handoutMasterIdLst>
-    <p:handoutMasterId r:id="rId21"/>
+    <p:handoutMasterId r:id="rId23"/>
   </p:handoutMasterIdLst>
   <p:sldIdLst>
     <p:sldId id="278" r:id="rId5"/>
@@ -23,9 +23,11 @@
     <p:sldId id="286" r:id="rId14"/>
     <p:sldId id="296" r:id="rId15"/>
     <p:sldId id="287" r:id="rId16"/>
-    <p:sldId id="297" r:id="rId17"/>
-    <p:sldId id="290" r:id="rId18"/>
-    <p:sldId id="292" r:id="rId19"/>
+    <p:sldId id="298" r:id="rId17"/>
+    <p:sldId id="299" r:id="rId18"/>
+    <p:sldId id="297" r:id="rId19"/>
+    <p:sldId id="290" r:id="rId20"/>
+    <p:sldId id="292" r:id="rId21"/>
   </p:sldIdLst>
   <p:sldSz cx="12192000" cy="6858000"/>
   <p:notesSz cx="6858000" cy="9144000"/>
@@ -146,6 +148,143 @@
 </p:presentation>
 </file>
 
+<file path=ppt/revisionInfo.xml><?xml version="1.0" encoding="utf-8"?>
+<p1510:revInfo xmlns:a="http://schemas.openxmlformats.org/drawingml/2006/main" xmlns:r="http://schemas.openxmlformats.org/officeDocument/2006/relationships" xmlns:p1510="http://schemas.microsoft.com/office/powerpoint/2015/10/main">
+  <p1510:revLst>
+    <p1510:client id="{C0FD1C19-90FD-4C6C-9EDE-BCEC8284A109}" v="3" dt="2025-01-16T00:05:10.452"/>
+  </p1510:revLst>
+</p1510:revInfo>
+</file>
+
+<file path=ppt/changesInfos/changesInfo1.xml><?xml version="1.0" encoding="utf-8"?>
+<pc:chgInfo xmlns:a="http://schemas.openxmlformats.org/drawingml/2006/main" xmlns:r="http://schemas.openxmlformats.org/officeDocument/2006/relationships" xmlns:ac="http://schemas.microsoft.com/office/drawing/2013/main/command" xmlns:pc="http://schemas.microsoft.com/office/powerpoint/2013/main/command">
+  <pc:docChgLst>
+    <pc:chgData name="Mehdi Afiatpour" userId="0d916f10-5445-4adf-bb23-aa086e4204ed" providerId="ADAL" clId="{C0FD1C19-90FD-4C6C-9EDE-BCEC8284A109}"/>
+    <pc:docChg chg="custSel addSld modSld">
+      <pc:chgData name="Mehdi Afiatpour" userId="0d916f10-5445-4adf-bb23-aa086e4204ed" providerId="ADAL" clId="{C0FD1C19-90FD-4C6C-9EDE-BCEC8284A109}" dt="2025-01-16T00:05:48.745" v="115" actId="20577"/>
+      <pc:docMkLst>
+        <pc:docMk/>
+      </pc:docMkLst>
+      <pc:sldChg chg="modSp mod">
+        <pc:chgData name="Mehdi Afiatpour" userId="0d916f10-5445-4adf-bb23-aa086e4204ed" providerId="ADAL" clId="{C0FD1C19-90FD-4C6C-9EDE-BCEC8284A109}" dt="2025-01-16T00:02:48.518" v="37" actId="20577"/>
+        <pc:sldMkLst>
+          <pc:docMk/>
+          <pc:sldMk cId="414523832" sldId="288"/>
+        </pc:sldMkLst>
+        <pc:spChg chg="mod">
+          <ac:chgData name="Mehdi Afiatpour" userId="0d916f10-5445-4adf-bb23-aa086e4204ed" providerId="ADAL" clId="{C0FD1C19-90FD-4C6C-9EDE-BCEC8284A109}" dt="2025-01-16T00:02:48.518" v="37" actId="20577"/>
+          <ac:spMkLst>
+            <pc:docMk/>
+            <pc:sldMk cId="414523832" sldId="288"/>
+            <ac:spMk id="3" creationId="{ECC8AA23-D8D0-93BE-5C5F-103A750B0D2F}"/>
+          </ac:spMkLst>
+        </pc:spChg>
+      </pc:sldChg>
+      <pc:sldChg chg="modSp mod">
+        <pc:chgData name="Mehdi Afiatpour" userId="0d916f10-5445-4adf-bb23-aa086e4204ed" providerId="ADAL" clId="{C0FD1C19-90FD-4C6C-9EDE-BCEC8284A109}" dt="2025-01-16T00:05:48.745" v="115" actId="20577"/>
+        <pc:sldMkLst>
+          <pc:docMk/>
+          <pc:sldMk cId="2547630249" sldId="292"/>
+        </pc:sldMkLst>
+        <pc:spChg chg="mod">
+          <ac:chgData name="Mehdi Afiatpour" userId="0d916f10-5445-4adf-bb23-aa086e4204ed" providerId="ADAL" clId="{C0FD1C19-90FD-4C6C-9EDE-BCEC8284A109}" dt="2025-01-16T00:05:48.745" v="115" actId="20577"/>
+          <ac:spMkLst>
+            <pc:docMk/>
+            <pc:sldMk cId="2547630249" sldId="292"/>
+            <ac:spMk id="3" creationId="{1BE98EFF-197D-3136-70B9-7BBD30A48931}"/>
+          </ac:spMkLst>
+        </pc:spChg>
+      </pc:sldChg>
+      <pc:sldChg chg="modSp mod">
+        <pc:chgData name="Mehdi Afiatpour" userId="0d916f10-5445-4adf-bb23-aa086e4204ed" providerId="ADAL" clId="{C0FD1C19-90FD-4C6C-9EDE-BCEC8284A109}" dt="2025-01-16T00:03:55.148" v="57" actId="20577"/>
+        <pc:sldMkLst>
+          <pc:docMk/>
+          <pc:sldMk cId="2382206231" sldId="295"/>
+        </pc:sldMkLst>
+        <pc:spChg chg="mod">
+          <ac:chgData name="Mehdi Afiatpour" userId="0d916f10-5445-4adf-bb23-aa086e4204ed" providerId="ADAL" clId="{C0FD1C19-90FD-4C6C-9EDE-BCEC8284A109}" dt="2025-01-16T00:03:55.148" v="57" actId="20577"/>
+          <ac:spMkLst>
+            <pc:docMk/>
+            <pc:sldMk cId="2382206231" sldId="295"/>
+            <ac:spMk id="3" creationId="{1C03FCE8-77F3-9634-98D3-055B66ADDDAC}"/>
+          </ac:spMkLst>
+        </pc:spChg>
+      </pc:sldChg>
+      <pc:sldChg chg="modSp add mod">
+        <pc:chgData name="Mehdi Afiatpour" userId="0d916f10-5445-4adf-bb23-aa086e4204ed" providerId="ADAL" clId="{C0FD1C19-90FD-4C6C-9EDE-BCEC8284A109}" dt="2025-01-16T00:05:03.455" v="87" actId="20577"/>
+        <pc:sldMkLst>
+          <pc:docMk/>
+          <pc:sldMk cId="4134107604" sldId="298"/>
+        </pc:sldMkLst>
+        <pc:spChg chg="mod">
+          <ac:chgData name="Mehdi Afiatpour" userId="0d916f10-5445-4adf-bb23-aa086e4204ed" providerId="ADAL" clId="{C0FD1C19-90FD-4C6C-9EDE-BCEC8284A109}" dt="2025-01-16T00:04:55.885" v="65" actId="20577"/>
+          <ac:spMkLst>
+            <pc:docMk/>
+            <pc:sldMk cId="4134107604" sldId="298"/>
+            <ac:spMk id="7" creationId="{F569730C-1F56-CC2D-F259-50BA5A0901D6}"/>
+          </ac:spMkLst>
+        </pc:spChg>
+        <pc:spChg chg="mod">
+          <ac:chgData name="Mehdi Afiatpour" userId="0d916f10-5445-4adf-bb23-aa086e4204ed" providerId="ADAL" clId="{C0FD1C19-90FD-4C6C-9EDE-BCEC8284A109}" dt="2025-01-16T00:05:03.455" v="87" actId="20577"/>
+          <ac:spMkLst>
+            <pc:docMk/>
+            <pc:sldMk cId="4134107604" sldId="298"/>
+            <ac:spMk id="8" creationId="{89AE829F-1F31-51B7-377D-48C0B6CC511B}"/>
+          </ac:spMkLst>
+        </pc:spChg>
+      </pc:sldChg>
+      <pc:sldChg chg="addSp delSp modSp add mod">
+        <pc:chgData name="Mehdi Afiatpour" userId="0d916f10-5445-4adf-bb23-aa086e4204ed" providerId="ADAL" clId="{C0FD1C19-90FD-4C6C-9EDE-BCEC8284A109}" dt="2025-01-16T00:05:26.474" v="97" actId="478"/>
+        <pc:sldMkLst>
+          <pc:docMk/>
+          <pc:sldMk cId="3991520033" sldId="299"/>
+        </pc:sldMkLst>
+        <pc:spChg chg="mod">
+          <ac:chgData name="Mehdi Afiatpour" userId="0d916f10-5445-4adf-bb23-aa086e4204ed" providerId="ADAL" clId="{C0FD1C19-90FD-4C6C-9EDE-BCEC8284A109}" dt="2025-01-16T00:05:13.288" v="95" actId="20577"/>
+          <ac:spMkLst>
+            <pc:docMk/>
+            <pc:sldMk cId="3991520033" sldId="299"/>
+            <ac:spMk id="2" creationId="{18F162CB-8AE1-689A-2B38-79802FE8C368}"/>
+          </ac:spMkLst>
+        </pc:spChg>
+        <pc:spChg chg="add del mod">
+          <ac:chgData name="Mehdi Afiatpour" userId="0d916f10-5445-4adf-bb23-aa086e4204ed" providerId="ADAL" clId="{C0FD1C19-90FD-4C6C-9EDE-BCEC8284A109}" dt="2025-01-16T00:05:26.474" v="97" actId="478"/>
+          <ac:spMkLst>
+            <pc:docMk/>
+            <pc:sldMk cId="3991520033" sldId="299"/>
+            <ac:spMk id="4" creationId="{09069F6C-42FE-C449-1534-C26AF89A8E5D}"/>
+          </ac:spMkLst>
+        </pc:spChg>
+        <pc:spChg chg="del">
+          <ac:chgData name="Mehdi Afiatpour" userId="0d916f10-5445-4adf-bb23-aa086e4204ed" providerId="ADAL" clId="{C0FD1C19-90FD-4C6C-9EDE-BCEC8284A109}" dt="2025-01-16T00:05:21.329" v="96" actId="478"/>
+          <ac:spMkLst>
+            <pc:docMk/>
+            <pc:sldMk cId="3991520033" sldId="299"/>
+            <ac:spMk id="10" creationId="{5B7A4CAF-6FBB-1F67-E964-84AF1CD38797}"/>
+          </ac:spMkLst>
+        </pc:spChg>
+        <pc:spChg chg="del">
+          <ac:chgData name="Mehdi Afiatpour" userId="0d916f10-5445-4adf-bb23-aa086e4204ed" providerId="ADAL" clId="{C0FD1C19-90FD-4C6C-9EDE-BCEC8284A109}" dt="2025-01-16T00:05:21.329" v="96" actId="478"/>
+          <ac:spMkLst>
+            <pc:docMk/>
+            <pc:sldMk cId="3991520033" sldId="299"/>
+            <ac:spMk id="13" creationId="{32450E11-82F8-A387-DDB6-3CDC8A1959C8}"/>
+          </ac:spMkLst>
+        </pc:spChg>
+        <pc:spChg chg="del">
+          <ac:chgData name="Mehdi Afiatpour" userId="0d916f10-5445-4adf-bb23-aa086e4204ed" providerId="ADAL" clId="{C0FD1C19-90FD-4C6C-9EDE-BCEC8284A109}" dt="2025-01-16T00:05:21.329" v="96" actId="478"/>
+          <ac:spMkLst>
+            <pc:docMk/>
+            <pc:sldMk cId="3991520033" sldId="299"/>
+            <ac:spMk id="16" creationId="{D6D84732-EE56-46B5-887C-997BFF170E8C}"/>
+          </ac:spMkLst>
+        </pc:spChg>
+      </pc:sldChg>
+    </pc:docChg>
+  </pc:docChgLst>
+</pc:chgInfo>
+</file>
+
 <file path=ppt/handoutMasters/handoutMaster1.xml><?xml version="1.0" encoding="utf-8"?>
 <p:handoutMaster xmlns:a="http://schemas.openxmlformats.org/drawingml/2006/main" xmlns:r="http://schemas.openxmlformats.org/officeDocument/2006/relationships" xmlns:p="http://schemas.openxmlformats.org/presentationml/2006/main">
   <p:cSld>
@@ -240,7 +379,7 @@
           <a:p>
             <a:fld id="{717BC71B-6527-4638-937B-C93EB849CB02}" type="datetimeFigureOut">
               <a:rPr lang="en-US" smtClean="0"/>
-              <a:t>1/13/2025</a:t>
+              <a:t>1/15/2025</a:t>
             </a:fld>
             <a:endParaRPr lang="en-US" dirty="0"/>
           </a:p>
@@ -417,7 +556,7 @@
           <a:p>
             <a:fld id="{425465A2-8C9C-419F-9FD8-234480873777}" type="datetimeFigureOut">
               <a:rPr lang="en-US" smtClean="0"/>
-              <a:t>1/13/2025</a:t>
+              <a:t>1/15/2025</a:t>
             </a:fld>
             <a:endParaRPr lang="en-US" dirty="0"/>
           </a:p>
@@ -884,6 +1023,114 @@
         <p:cNvPr id="1" name="">
           <a:extLst>
             <a:ext uri="{FF2B5EF4-FFF2-40B4-BE49-F238E27FC236}">
+              <a16:creationId xmlns:a16="http://schemas.microsoft.com/office/drawing/2014/main" id="{DCF62B4F-9973-D68C-D1D0-429099C25933}"/>
+            </a:ext>
+          </a:extLst>
+        </p:cNvPr>
+        <p:cNvGrpSpPr/>
+        <p:nvPr/>
+      </p:nvGrpSpPr>
+      <p:grpSpPr>
+        <a:xfrm>
+          <a:off x="0" y="0"/>
+          <a:ext cx="0" cy="0"/>
+          <a:chOff x="0" y="0"/>
+          <a:chExt cx="0" cy="0"/>
+        </a:xfrm>
+      </p:grpSpPr>
+      <p:sp>
+        <p:nvSpPr>
+          <p:cNvPr id="2" name="Slide Image Placeholder 1">
+            <a:extLst>
+              <a:ext uri="{FF2B5EF4-FFF2-40B4-BE49-F238E27FC236}">
+                <a16:creationId xmlns:a16="http://schemas.microsoft.com/office/drawing/2014/main" id="{B149CB42-CD89-032B-E8C7-690DC4299B49}"/>
+              </a:ext>
+            </a:extLst>
+          </p:cNvPr>
+          <p:cNvSpPr>
+            <a:spLocks noGrp="1" noRot="1" noChangeAspect="1"/>
+          </p:cNvSpPr>
+          <p:nvPr>
+            <p:ph type="sldImg"/>
+          </p:nvPr>
+        </p:nvSpPr>
+        <p:spPr/>
+      </p:sp>
+      <p:sp>
+        <p:nvSpPr>
+          <p:cNvPr id="3" name="Notes Placeholder 2">
+            <a:extLst>
+              <a:ext uri="{FF2B5EF4-FFF2-40B4-BE49-F238E27FC236}">
+                <a16:creationId xmlns:a16="http://schemas.microsoft.com/office/drawing/2014/main" id="{A806AA9B-18F8-F72F-7681-BDC3A55D8511}"/>
+              </a:ext>
+            </a:extLst>
+          </p:cNvPr>
+          <p:cNvSpPr>
+            <a:spLocks noGrp="1"/>
+          </p:cNvSpPr>
+          <p:nvPr>
+            <p:ph type="body" idx="1"/>
+          </p:nvPr>
+        </p:nvSpPr>
+        <p:spPr/>
+        <p:txBody>
+          <a:bodyPr/>
+          <a:lstStyle/>
+          <a:p>
+            <a:endParaRPr lang="en-US" dirty="0"/>
+          </a:p>
+        </p:txBody>
+      </p:sp>
+      <p:sp>
+        <p:nvSpPr>
+          <p:cNvPr id="4" name="Slide Number Placeholder 3">
+            <a:extLst>
+              <a:ext uri="{FF2B5EF4-FFF2-40B4-BE49-F238E27FC236}">
+                <a16:creationId xmlns:a16="http://schemas.microsoft.com/office/drawing/2014/main" id="{228F2D3A-C74F-DB33-E24A-F22EC543188B}"/>
+              </a:ext>
+            </a:extLst>
+          </p:cNvPr>
+          <p:cNvSpPr>
+            <a:spLocks noGrp="1"/>
+          </p:cNvSpPr>
+          <p:nvPr>
+            <p:ph type="sldNum" sz="quarter" idx="5"/>
+          </p:nvPr>
+        </p:nvSpPr>
+        <p:spPr/>
+        <p:txBody>
+          <a:bodyPr/>
+          <a:lstStyle/>
+          <a:p>
+            <a:fld id="{E7AF00E9-A49D-4007-B3B9-A3783809E505}" type="slidenum">
+              <a:rPr lang="en-US" smtClean="0"/>
+              <a:t>13</a:t>
+            </a:fld>
+            <a:endParaRPr lang="en-US" dirty="0"/>
+          </a:p>
+        </p:txBody>
+      </p:sp>
+    </p:spTree>
+    <p:extLst>
+      <p:ext uri="{BB962C8B-B14F-4D97-AF65-F5344CB8AC3E}">
+        <p14:creationId xmlns:p14="http://schemas.microsoft.com/office/powerpoint/2010/main" val="2402288120"/>
+      </p:ext>
+    </p:extLst>
+  </p:cSld>
+  <p:clrMapOvr>
+    <a:masterClrMapping/>
+  </p:clrMapOvr>
+</p:notes>
+</file>
+
+<file path=ppt/notesSlides/notesSlide12.xml><?xml version="1.0" encoding="utf-8"?>
+<p:notes xmlns:a="http://schemas.openxmlformats.org/drawingml/2006/main" xmlns:r="http://schemas.openxmlformats.org/officeDocument/2006/relationships" xmlns:p="http://schemas.openxmlformats.org/presentationml/2006/main">
+  <p:cSld>
+    <p:spTree>
+      <p:nvGrpSpPr>
+        <p:cNvPr id="1" name="">
+          <a:extLst>
+            <a:ext uri="{FF2B5EF4-FFF2-40B4-BE49-F238E27FC236}">
               <a16:creationId xmlns:a16="http://schemas.microsoft.com/office/drawing/2014/main" id="{986384C2-8025-D65B-5D3B-57DCFE0C311A}"/>
             </a:ext>
           </a:extLst>
@@ -965,7 +1212,7 @@
           <a:p>
             <a:fld id="{E7AF00E9-A49D-4007-B3B9-A3783809E505}" type="slidenum">
               <a:rPr lang="en-US" smtClean="0"/>
-              <a:t>13</a:t>
+              <a:t>15</a:t>
             </a:fld>
             <a:endParaRPr lang="en-US" dirty="0"/>
           </a:p>
@@ -19504,6 +19751,196 @@
         <p:cNvPr id="1" name="">
           <a:extLst>
             <a:ext uri="{FF2B5EF4-FFF2-40B4-BE49-F238E27FC236}">
+              <a16:creationId xmlns:a16="http://schemas.microsoft.com/office/drawing/2014/main" id="{7413790A-6827-5EB6-3E73-D53D86DD51D1}"/>
+            </a:ext>
+          </a:extLst>
+        </p:cNvPr>
+        <p:cNvGrpSpPr/>
+        <p:nvPr/>
+      </p:nvGrpSpPr>
+      <p:grpSpPr>
+        <a:xfrm>
+          <a:off x="0" y="0"/>
+          <a:ext cx="0" cy="0"/>
+          <a:chOff x="0" y="0"/>
+          <a:chExt cx="0" cy="0"/>
+        </a:xfrm>
+      </p:grpSpPr>
+      <p:pic>
+        <p:nvPicPr>
+          <p:cNvPr id="5" name="Picture Placeholder 7" descr="Data Points Digital background">
+            <a:extLst>
+              <a:ext uri="{FF2B5EF4-FFF2-40B4-BE49-F238E27FC236}">
+                <a16:creationId xmlns:a16="http://schemas.microsoft.com/office/drawing/2014/main" id="{93864380-626A-3A32-0178-DAD93D600802}"/>
+              </a:ext>
+            </a:extLst>
+          </p:cNvPr>
+          <p:cNvPicPr>
+            <a:picLocks noGrp="1" noChangeAspect="1"/>
+          </p:cNvPicPr>
+          <p:nvPr>
+            <p:ph type="pic" sz="quarter" idx="13"/>
+          </p:nvPr>
+        </p:nvPicPr>
+        <p:blipFill>
+          <a:blip r:embed="rId3">
+            <a:alphaModFix amt="45000"/>
+            <a:extLst>
+              <a:ext uri="{28A0092B-C50C-407E-A947-70E740481C1C}">
+                <a14:useLocalDpi xmlns:a14="http://schemas.microsoft.com/office/drawing/2010/main" val="0"/>
+              </a:ext>
+            </a:extLst>
+          </a:blip>
+          <a:srcRect/>
+          <a:stretch/>
+        </p:blipFill>
+        <p:spPr/>
+      </p:pic>
+      <p:sp>
+        <p:nvSpPr>
+          <p:cNvPr id="7" name="Title 6">
+            <a:extLst>
+              <a:ext uri="{FF2B5EF4-FFF2-40B4-BE49-F238E27FC236}">
+                <a16:creationId xmlns:a16="http://schemas.microsoft.com/office/drawing/2014/main" id="{F569730C-1F56-CC2D-F259-50BA5A0901D6}"/>
+              </a:ext>
+            </a:extLst>
+          </p:cNvPr>
+          <p:cNvSpPr>
+            <a:spLocks noGrp="1"/>
+          </p:cNvSpPr>
+          <p:nvPr>
+            <p:ph type="ctrTitle"/>
+          </p:nvPr>
+        </p:nvSpPr>
+        <p:spPr/>
+        <p:txBody>
+          <a:bodyPr/>
+          <a:lstStyle/>
+          <a:p>
+            <a:r>
+              <a:rPr lang="en-US" dirty="0"/>
+              <a:t>Visuals</a:t>
+            </a:r>
+          </a:p>
+        </p:txBody>
+      </p:sp>
+      <p:sp>
+        <p:nvSpPr>
+          <p:cNvPr id="8" name="Subtitle 7">
+            <a:extLst>
+              <a:ext uri="{FF2B5EF4-FFF2-40B4-BE49-F238E27FC236}">
+                <a16:creationId xmlns:a16="http://schemas.microsoft.com/office/drawing/2014/main" id="{89AE829F-1F31-51B7-377D-48C0B6CC511B}"/>
+              </a:ext>
+            </a:extLst>
+          </p:cNvPr>
+          <p:cNvSpPr>
+            <a:spLocks noGrp="1"/>
+          </p:cNvSpPr>
+          <p:nvPr>
+            <p:ph type="subTitle" idx="1"/>
+          </p:nvPr>
+        </p:nvSpPr>
+        <p:spPr/>
+        <p:txBody>
+          <a:bodyPr/>
+          <a:lstStyle/>
+          <a:p>
+            <a:r>
+              <a:rPr lang="en-US" dirty="0"/>
+              <a:t>Additional Information</a:t>
+            </a:r>
+          </a:p>
+        </p:txBody>
+      </p:sp>
+    </p:spTree>
+    <p:extLst>
+      <p:ext uri="{BB962C8B-B14F-4D97-AF65-F5344CB8AC3E}">
+        <p14:creationId xmlns:p14="http://schemas.microsoft.com/office/powerpoint/2010/main" val="4134107604"/>
+      </p:ext>
+    </p:extLst>
+  </p:cSld>
+  <p:clrMapOvr>
+    <a:masterClrMapping/>
+  </p:clrMapOvr>
+</p:sld>
+</file>
+
+<file path=ppt/slides/slide14.xml><?xml version="1.0" encoding="utf-8"?>
+<p:sld xmlns:a="http://schemas.openxmlformats.org/drawingml/2006/main" xmlns:r="http://schemas.openxmlformats.org/officeDocument/2006/relationships" xmlns:p="http://schemas.openxmlformats.org/presentationml/2006/main">
+  <p:cSld>
+    <p:spTree>
+      <p:nvGrpSpPr>
+        <p:cNvPr id="1" name="">
+          <a:extLst>
+            <a:ext uri="{FF2B5EF4-FFF2-40B4-BE49-F238E27FC236}">
+              <a16:creationId xmlns:a16="http://schemas.microsoft.com/office/drawing/2014/main" id="{B3855F49-30F0-2609-3A94-0C33FF543FBA}"/>
+            </a:ext>
+          </a:extLst>
+        </p:cNvPr>
+        <p:cNvGrpSpPr/>
+        <p:nvPr/>
+      </p:nvGrpSpPr>
+      <p:grpSpPr>
+        <a:xfrm>
+          <a:off x="0" y="0"/>
+          <a:ext cx="0" cy="0"/>
+          <a:chOff x="0" y="0"/>
+          <a:chExt cx="0" cy="0"/>
+        </a:xfrm>
+      </p:grpSpPr>
+      <p:sp>
+        <p:nvSpPr>
+          <p:cNvPr id="2" name="Title 1">
+            <a:extLst>
+              <a:ext uri="{FF2B5EF4-FFF2-40B4-BE49-F238E27FC236}">
+                <a16:creationId xmlns:a16="http://schemas.microsoft.com/office/drawing/2014/main" id="{18F162CB-8AE1-689A-2B38-79802FE8C368}"/>
+              </a:ext>
+            </a:extLst>
+          </p:cNvPr>
+          <p:cNvSpPr>
+            <a:spLocks noGrp="1"/>
+          </p:cNvSpPr>
+          <p:nvPr>
+            <p:ph type="title"/>
+          </p:nvPr>
+        </p:nvSpPr>
+        <p:spPr>
+          <a:noFill/>
+        </p:spPr>
+        <p:txBody>
+          <a:bodyPr lIns="0">
+            <a:normAutofit/>
+          </a:bodyPr>
+          <a:lstStyle/>
+          <a:p>
+            <a:r>
+              <a:rPr lang="en-US" dirty="0"/>
+              <a:t>Visuals</a:t>
+            </a:r>
+          </a:p>
+        </p:txBody>
+      </p:sp>
+    </p:spTree>
+    <p:extLst>
+      <p:ext uri="{BB962C8B-B14F-4D97-AF65-F5344CB8AC3E}">
+        <p14:creationId xmlns:p14="http://schemas.microsoft.com/office/powerpoint/2010/main" val="3991520033"/>
+      </p:ext>
+    </p:extLst>
+  </p:cSld>
+  <p:clrMapOvr>
+    <a:masterClrMapping/>
+  </p:clrMapOvr>
+</p:sld>
+</file>
+
+<file path=ppt/slides/slide15.xml><?xml version="1.0" encoding="utf-8"?>
+<p:sld xmlns:a="http://schemas.openxmlformats.org/drawingml/2006/main" xmlns:r="http://schemas.openxmlformats.org/officeDocument/2006/relationships" xmlns:p="http://schemas.openxmlformats.org/presentationml/2006/main">
+  <p:cSld>
+    <p:spTree>
+      <p:nvGrpSpPr>
+        <p:cNvPr id="1" name="">
+          <a:extLst>
+            <a:ext uri="{FF2B5EF4-FFF2-40B4-BE49-F238E27FC236}">
               <a16:creationId xmlns:a16="http://schemas.microsoft.com/office/drawing/2014/main" id="{9E77CDAF-1B6C-8F7C-290D-6B2BD3FF173E}"/>
             </a:ext>
           </a:extLst>
@@ -19618,7 +20055,7 @@
 </p:sld>
 </file>
 
-<file path=ppt/slides/slide14.xml><?xml version="1.0" encoding="utf-8"?>
+<file path=ppt/slides/slide16.xml><?xml version="1.0" encoding="utf-8"?>
 <p:sld xmlns:a="http://schemas.openxmlformats.org/drawingml/2006/main" xmlns:r="http://schemas.openxmlformats.org/officeDocument/2006/relationships" xmlns:p="http://schemas.openxmlformats.org/presentationml/2006/main">
   <p:cSld>
     <p:spTree>
@@ -20185,7 +20622,7 @@
 </p:sld>
 </file>
 
-<file path=ppt/slides/slide15.xml><?xml version="1.0" encoding="utf-8"?>
+<file path=ppt/slides/slide17.xml><?xml version="1.0" encoding="utf-8"?>
 <p:sld xmlns:a="http://schemas.openxmlformats.org/drawingml/2006/main" xmlns:r="http://schemas.openxmlformats.org/officeDocument/2006/relationships" xmlns:p="http://schemas.openxmlformats.org/presentationml/2006/main">
   <p:cSld>
     <p:spTree>
@@ -20261,13 +20698,13 @@
           <a:p>
             <a:r>
               <a:rPr lang="en-US" dirty="0"/>
-              <a:t>Austin </a:t>
+              <a:t>Austin McCormick</a:t>
             </a:r>
           </a:p>
           <a:p>
             <a:r>
               <a:rPr lang="en-US" dirty="0"/>
-              <a:t>Devin</a:t>
+              <a:t>Devin Carter</a:t>
             </a:r>
           </a:p>
           <a:p>
@@ -21212,7 +21649,7 @@
             </a:r>
             <a:r>
               <a:rPr lang="en-US" dirty="0"/>
-              <a:t>Nasdaq DataLinks.</a:t>
+              <a:t>Tradestation Web API.</a:t>
             </a:r>
           </a:p>
           <a:p>
@@ -21227,7 +21664,7 @@
             </a:r>
             <a:r>
               <a:rPr lang="en-US" dirty="0"/>
-              <a:t>One year of trading data.</a:t>
+              <a:t>25+ years of trading data.</a:t>
             </a:r>
           </a:p>
           <a:p>
@@ -21701,6 +22138,12 @@
             <a:r>
               <a:rPr lang="en-US" dirty="0"/>
               <a:t>MACD (Moving Average Convergence Divergence): Analyze trend strength and direction.</a:t>
+            </a:r>
+          </a:p>
+          <a:p>
+            <a:r>
+              <a:rPr lang="en-US" dirty="0"/>
+              <a:t>Seasonality</a:t>
             </a:r>
           </a:p>
         </p:txBody>
@@ -22626,12 +23069,23 @@
 </file>
 
 <file path=customXml/item1.xml><?xml version="1.0" encoding="utf-8"?>
-<?mso-contentType ?>
-<FormTemplates xmlns="http://schemas.microsoft.com/sharepoint/v3/contenttype/forms">
-  <Display>DocumentLibraryForm</Display>
-  <Edit>DocumentLibraryForm</Edit>
-  <New>DocumentLibraryForm</New>
-</FormTemplates>
+<p:properties xmlns:p="http://schemas.microsoft.com/office/2006/metadata/properties" xmlns:xsi="http://www.w3.org/2001/XMLSchema-instance" xmlns:pc="http://schemas.microsoft.com/office/infopath/2007/PartnerControls">
+  <documentManagement>
+    <_ip_UnifiedCompliancePolicyUIAction xmlns="http://schemas.microsoft.com/sharepoint/v3" xsi:nil="true"/>
+    <Image xmlns="71af3243-3dd4-4a8d-8c0d-dd76da1f02a5">
+      <Url xsi:nil="true"/>
+      <Description xsi:nil="true"/>
+    </Image>
+    <Status xmlns="71af3243-3dd4-4a8d-8c0d-dd76da1f02a5">Not started</Status>
+    <Background xmlns="71af3243-3dd4-4a8d-8c0d-dd76da1f02a5">false</Background>
+    <_ip_UnifiedCompliancePolicyProperties xmlns="http://schemas.microsoft.com/sharepoint/v3" xsi:nil="true"/>
+    <ImageTagsTaxHTField xmlns="71af3243-3dd4-4a8d-8c0d-dd76da1f02a5">
+      <Terms xmlns="http://schemas.microsoft.com/office/infopath/2007/PartnerControls"/>
+    </ImageTagsTaxHTField>
+    <TaxCatchAll xmlns="230e9df3-be65-4c73-a93b-d1236ebd677e" xsi:nil="true"/>
+    <MediaServiceKeyPoints xmlns="71af3243-3dd4-4a8d-8c0d-dd76da1f02a5" xsi:nil="true"/>
+  </documentManagement>
+</p:properties>
 </file>
 
 <file path=customXml/item2.xml><?xml version="1.0" encoding="utf-8"?>
@@ -22947,29 +23401,29 @@
 </file>
 
 <file path=customXml/item3.xml><?xml version="1.0" encoding="utf-8"?>
-<p:properties xmlns:p="http://schemas.microsoft.com/office/2006/metadata/properties" xmlns:xsi="http://www.w3.org/2001/XMLSchema-instance" xmlns:pc="http://schemas.microsoft.com/office/infopath/2007/PartnerControls">
-  <documentManagement>
-    <_ip_UnifiedCompliancePolicyUIAction xmlns="http://schemas.microsoft.com/sharepoint/v3" xsi:nil="true"/>
-    <Image xmlns="71af3243-3dd4-4a8d-8c0d-dd76da1f02a5">
-      <Url xsi:nil="true"/>
-      <Description xsi:nil="true"/>
-    </Image>
-    <Status xmlns="71af3243-3dd4-4a8d-8c0d-dd76da1f02a5">Not started</Status>
-    <Background xmlns="71af3243-3dd4-4a8d-8c0d-dd76da1f02a5">false</Background>
-    <_ip_UnifiedCompliancePolicyProperties xmlns="http://schemas.microsoft.com/sharepoint/v3" xsi:nil="true"/>
-    <ImageTagsTaxHTField xmlns="71af3243-3dd4-4a8d-8c0d-dd76da1f02a5">
-      <Terms xmlns="http://schemas.microsoft.com/office/infopath/2007/PartnerControls"/>
-    </ImageTagsTaxHTField>
-    <TaxCatchAll xmlns="230e9df3-be65-4c73-a93b-d1236ebd677e" xsi:nil="true"/>
-    <MediaServiceKeyPoints xmlns="71af3243-3dd4-4a8d-8c0d-dd76da1f02a5" xsi:nil="true"/>
-  </documentManagement>
-</p:properties>
+<?mso-contentType ?>
+<FormTemplates xmlns="http://schemas.microsoft.com/sharepoint/v3/contenttype/forms">
+  <Display>DocumentLibraryForm</Display>
+  <Edit>DocumentLibraryForm</Edit>
+  <New>DocumentLibraryForm</New>
+</FormTemplates>
 </file>
 
 <file path=customXml/itemProps1.xml><?xml version="1.0" encoding="utf-8"?>
-<ds:datastoreItem xmlns:ds="http://schemas.openxmlformats.org/officeDocument/2006/customXml" ds:itemID="{2F49CD38-5B57-4682-9FCE-B9174068D0AE}">
+<ds:datastoreItem xmlns:ds="http://schemas.openxmlformats.org/officeDocument/2006/customXml" ds:itemID="{1F342EE1-43E5-4AFB-895D-B61B9656DC14}">
   <ds:schemaRefs>
-    <ds:schemaRef ds:uri="http://schemas.microsoft.com/sharepoint/v3/contenttype/forms"/>
+    <ds:schemaRef ds:uri="http://schemas.microsoft.com/office/2006/documentManagement/types"/>
+    <ds:schemaRef ds:uri="http://schemas.microsoft.com/sharepoint/v3"/>
+    <ds:schemaRef ds:uri="http://purl.org/dc/dcmitype/"/>
+    <ds:schemaRef ds:uri="http://purl.org/dc/elements/1.1/"/>
+    <ds:schemaRef ds:uri="http://purl.org/dc/terms/"/>
+    <ds:schemaRef ds:uri="http://schemas.microsoft.com/office/infopath/2007/PartnerControls"/>
+    <ds:schemaRef ds:uri="http://schemas.microsoft.com/office/2006/metadata/properties"/>
+    <ds:schemaRef ds:uri="http://www.w3.org/XML/1998/namespace"/>
+    <ds:schemaRef ds:uri="http://schemas.openxmlformats.org/package/2006/metadata/core-properties"/>
+    <ds:schemaRef ds:uri="230e9df3-be65-4c73-a93b-d1236ebd677e"/>
+    <ds:schemaRef ds:uri="16c05727-aa75-4e4a-9b5f-8a80a1165891"/>
+    <ds:schemaRef ds:uri="71af3243-3dd4-4a8d-8c0d-dd76da1f02a5"/>
   </ds:schemaRefs>
 </ds:datastoreItem>
 </file>
@@ -22996,20 +23450,9 @@
 </file>
 
 <file path=customXml/itemProps3.xml><?xml version="1.0" encoding="utf-8"?>
-<ds:datastoreItem xmlns:ds="http://schemas.openxmlformats.org/officeDocument/2006/customXml" ds:itemID="{1F342EE1-43E5-4AFB-895D-B61B9656DC14}">
+<ds:datastoreItem xmlns:ds="http://schemas.openxmlformats.org/officeDocument/2006/customXml" ds:itemID="{2F49CD38-5B57-4682-9FCE-B9174068D0AE}">
   <ds:schemaRefs>
-    <ds:schemaRef ds:uri="http://schemas.microsoft.com/office/2006/documentManagement/types"/>
-    <ds:schemaRef ds:uri="http://schemas.microsoft.com/sharepoint/v3"/>
-    <ds:schemaRef ds:uri="http://purl.org/dc/dcmitype/"/>
-    <ds:schemaRef ds:uri="http://purl.org/dc/elements/1.1/"/>
-    <ds:schemaRef ds:uri="http://purl.org/dc/terms/"/>
-    <ds:schemaRef ds:uri="http://schemas.microsoft.com/office/infopath/2007/PartnerControls"/>
-    <ds:schemaRef ds:uri="http://schemas.microsoft.com/office/2006/metadata/properties"/>
-    <ds:schemaRef ds:uri="http://www.w3.org/XML/1998/namespace"/>
-    <ds:schemaRef ds:uri="http://schemas.openxmlformats.org/package/2006/metadata/core-properties"/>
-    <ds:schemaRef ds:uri="230e9df3-be65-4c73-a93b-d1236ebd677e"/>
-    <ds:schemaRef ds:uri="16c05727-aa75-4e4a-9b5f-8a80a1165891"/>
-    <ds:schemaRef ds:uri="71af3243-3dd4-4a8d-8c0d-dd76da1f02a5"/>
+    <ds:schemaRef ds:uri="http://schemas.microsoft.com/sharepoint/v3/contenttype/forms"/>
   </ds:schemaRefs>
 </ds:datastoreItem>
 </file>

</xml_diff>